<commit_message>
add sort via crowding and something other
</commit_message>
<xml_diff>
--- a/Оптимизация.pptx
+++ b/Оптимизация.pptx
@@ -142,7 +142,7 @@
           <p:cNvPr id="2" name="Заголовок 1">
             <a:extLst>
               <a:ext uri="{FF2B5EF4-FFF2-40B4-BE49-F238E27FC236}">
-                <a16:creationId xmlns:a16="http://schemas.microsoft.com/office/drawing/2014/main" xmlns="" id="{D2F28CD3-7D5A-406A-A20F-60E9A67B312E}"/>
+                <a16:creationId xmlns="" xmlns:a16="http://schemas.microsoft.com/office/drawing/2014/main" id="{D2F28CD3-7D5A-406A-A20F-60E9A67B312E}"/>
               </a:ext>
             </a:extLst>
           </p:cNvPr>
@@ -179,7 +179,7 @@
           <p:cNvPr id="3" name="Подзаголовок 2">
             <a:extLst>
               <a:ext uri="{FF2B5EF4-FFF2-40B4-BE49-F238E27FC236}">
-                <a16:creationId xmlns:a16="http://schemas.microsoft.com/office/drawing/2014/main" xmlns="" id="{F2CD528E-6DA6-457D-8385-C570070A53F1}"/>
+                <a16:creationId xmlns="" xmlns:a16="http://schemas.microsoft.com/office/drawing/2014/main" id="{F2CD528E-6DA6-457D-8385-C570070A53F1}"/>
               </a:ext>
             </a:extLst>
           </p:cNvPr>
@@ -249,7 +249,7 @@
           <p:cNvPr id="4" name="Дата 3">
             <a:extLst>
               <a:ext uri="{FF2B5EF4-FFF2-40B4-BE49-F238E27FC236}">
-                <a16:creationId xmlns:a16="http://schemas.microsoft.com/office/drawing/2014/main" xmlns="" id="{35E92B9A-EC87-46F7-8BBE-66A85BF84EF8}"/>
+                <a16:creationId xmlns="" xmlns:a16="http://schemas.microsoft.com/office/drawing/2014/main" id="{35E92B9A-EC87-46F7-8BBE-66A85BF84EF8}"/>
               </a:ext>
             </a:extLst>
           </p:cNvPr>
@@ -267,7 +267,7 @@
           <a:p>
             <a:fld id="{4ECA4943-241A-4077-AFED-06BF07B040DE}" type="datetimeFigureOut">
               <a:rPr lang="ru-RU" smtClean="0"/>
-              <a:t>18.11.2021</a:t>
+              <a:t>29.11.2021</a:t>
             </a:fld>
             <a:endParaRPr lang="ru-RU"/>
           </a:p>
@@ -278,7 +278,7 @@
           <p:cNvPr id="5" name="Нижний колонтитул 4">
             <a:extLst>
               <a:ext uri="{FF2B5EF4-FFF2-40B4-BE49-F238E27FC236}">
-                <a16:creationId xmlns:a16="http://schemas.microsoft.com/office/drawing/2014/main" xmlns="" id="{46258711-8EF5-4FF5-916F-41DCEA1395D7}"/>
+                <a16:creationId xmlns="" xmlns:a16="http://schemas.microsoft.com/office/drawing/2014/main" id="{46258711-8EF5-4FF5-916F-41DCEA1395D7}"/>
               </a:ext>
             </a:extLst>
           </p:cNvPr>
@@ -303,7 +303,7 @@
           <p:cNvPr id="6" name="Номер слайда 5">
             <a:extLst>
               <a:ext uri="{FF2B5EF4-FFF2-40B4-BE49-F238E27FC236}">
-                <a16:creationId xmlns:a16="http://schemas.microsoft.com/office/drawing/2014/main" xmlns="" id="{240F781F-5062-4D8E-80A6-F207F6219879}"/>
+                <a16:creationId xmlns="" xmlns:a16="http://schemas.microsoft.com/office/drawing/2014/main" id="{240F781F-5062-4D8E-80A6-F207F6219879}"/>
               </a:ext>
             </a:extLst>
           </p:cNvPr>
@@ -362,7 +362,7 @@
           <p:cNvPr id="2" name="Заголовок 1">
             <a:extLst>
               <a:ext uri="{FF2B5EF4-FFF2-40B4-BE49-F238E27FC236}">
-                <a16:creationId xmlns:a16="http://schemas.microsoft.com/office/drawing/2014/main" xmlns="" id="{2FD77FC1-CE68-4B3C-993C-3E2319DAD31F}"/>
+                <a16:creationId xmlns="" xmlns:a16="http://schemas.microsoft.com/office/drawing/2014/main" id="{2FD77FC1-CE68-4B3C-993C-3E2319DAD31F}"/>
               </a:ext>
             </a:extLst>
           </p:cNvPr>
@@ -390,7 +390,7 @@
           <p:cNvPr id="3" name="Вертикальный текст 2">
             <a:extLst>
               <a:ext uri="{FF2B5EF4-FFF2-40B4-BE49-F238E27FC236}">
-                <a16:creationId xmlns:a16="http://schemas.microsoft.com/office/drawing/2014/main" xmlns="" id="{4BF38F33-8136-4F4E-90A5-8EB7258DCC5B}"/>
+                <a16:creationId xmlns="" xmlns:a16="http://schemas.microsoft.com/office/drawing/2014/main" id="{4BF38F33-8136-4F4E-90A5-8EB7258DCC5B}"/>
               </a:ext>
             </a:extLst>
           </p:cNvPr>
@@ -447,7 +447,7 @@
           <p:cNvPr id="4" name="Дата 3">
             <a:extLst>
               <a:ext uri="{FF2B5EF4-FFF2-40B4-BE49-F238E27FC236}">
-                <a16:creationId xmlns:a16="http://schemas.microsoft.com/office/drawing/2014/main" xmlns="" id="{2130ECF3-B4D2-4F27-B670-34189D40630C}"/>
+                <a16:creationId xmlns="" xmlns:a16="http://schemas.microsoft.com/office/drawing/2014/main" id="{2130ECF3-B4D2-4F27-B670-34189D40630C}"/>
               </a:ext>
             </a:extLst>
           </p:cNvPr>
@@ -465,7 +465,7 @@
           <a:p>
             <a:fld id="{4ECA4943-241A-4077-AFED-06BF07B040DE}" type="datetimeFigureOut">
               <a:rPr lang="ru-RU" smtClean="0"/>
-              <a:t>18.11.2021</a:t>
+              <a:t>29.11.2021</a:t>
             </a:fld>
             <a:endParaRPr lang="ru-RU"/>
           </a:p>
@@ -476,7 +476,7 @@
           <p:cNvPr id="5" name="Нижний колонтитул 4">
             <a:extLst>
               <a:ext uri="{FF2B5EF4-FFF2-40B4-BE49-F238E27FC236}">
-                <a16:creationId xmlns:a16="http://schemas.microsoft.com/office/drawing/2014/main" xmlns="" id="{6DE60696-8370-48DA-8AEB-F08C59068D60}"/>
+                <a16:creationId xmlns="" xmlns:a16="http://schemas.microsoft.com/office/drawing/2014/main" id="{6DE60696-8370-48DA-8AEB-F08C59068D60}"/>
               </a:ext>
             </a:extLst>
           </p:cNvPr>
@@ -501,7 +501,7 @@
           <p:cNvPr id="6" name="Номер слайда 5">
             <a:extLst>
               <a:ext uri="{FF2B5EF4-FFF2-40B4-BE49-F238E27FC236}">
-                <a16:creationId xmlns:a16="http://schemas.microsoft.com/office/drawing/2014/main" xmlns="" id="{6AB6A997-AA7E-41F0-9EF6-354BA4E2B7CE}"/>
+                <a16:creationId xmlns="" xmlns:a16="http://schemas.microsoft.com/office/drawing/2014/main" id="{6AB6A997-AA7E-41F0-9EF6-354BA4E2B7CE}"/>
               </a:ext>
             </a:extLst>
           </p:cNvPr>
@@ -560,7 +560,7 @@
           <p:cNvPr id="2" name="Вертикальный заголовок 1">
             <a:extLst>
               <a:ext uri="{FF2B5EF4-FFF2-40B4-BE49-F238E27FC236}">
-                <a16:creationId xmlns:a16="http://schemas.microsoft.com/office/drawing/2014/main" xmlns="" id="{A7DF5ED6-8B30-46C8-BFCB-506C1D96531B}"/>
+                <a16:creationId xmlns="" xmlns:a16="http://schemas.microsoft.com/office/drawing/2014/main" id="{A7DF5ED6-8B30-46C8-BFCB-506C1D96531B}"/>
               </a:ext>
             </a:extLst>
           </p:cNvPr>
@@ -593,7 +593,7 @@
           <p:cNvPr id="3" name="Вертикальный текст 2">
             <a:extLst>
               <a:ext uri="{FF2B5EF4-FFF2-40B4-BE49-F238E27FC236}">
-                <a16:creationId xmlns:a16="http://schemas.microsoft.com/office/drawing/2014/main" xmlns="" id="{FC3E082D-9C51-4D82-80B3-DD2BDDF93397}"/>
+                <a16:creationId xmlns="" xmlns:a16="http://schemas.microsoft.com/office/drawing/2014/main" id="{FC3E082D-9C51-4D82-80B3-DD2BDDF93397}"/>
               </a:ext>
             </a:extLst>
           </p:cNvPr>
@@ -655,7 +655,7 @@
           <p:cNvPr id="4" name="Дата 3">
             <a:extLst>
               <a:ext uri="{FF2B5EF4-FFF2-40B4-BE49-F238E27FC236}">
-                <a16:creationId xmlns:a16="http://schemas.microsoft.com/office/drawing/2014/main" xmlns="" id="{5CEBCB72-0CD8-487C-9D40-39426B4A3B6D}"/>
+                <a16:creationId xmlns="" xmlns:a16="http://schemas.microsoft.com/office/drawing/2014/main" id="{5CEBCB72-0CD8-487C-9D40-39426B4A3B6D}"/>
               </a:ext>
             </a:extLst>
           </p:cNvPr>
@@ -673,7 +673,7 @@
           <a:p>
             <a:fld id="{4ECA4943-241A-4077-AFED-06BF07B040DE}" type="datetimeFigureOut">
               <a:rPr lang="ru-RU" smtClean="0"/>
-              <a:t>18.11.2021</a:t>
+              <a:t>29.11.2021</a:t>
             </a:fld>
             <a:endParaRPr lang="ru-RU"/>
           </a:p>
@@ -684,7 +684,7 @@
           <p:cNvPr id="5" name="Нижний колонтитул 4">
             <a:extLst>
               <a:ext uri="{FF2B5EF4-FFF2-40B4-BE49-F238E27FC236}">
-                <a16:creationId xmlns:a16="http://schemas.microsoft.com/office/drawing/2014/main" xmlns="" id="{E7093C87-2EED-4EF1-B169-0F5A453030BD}"/>
+                <a16:creationId xmlns="" xmlns:a16="http://schemas.microsoft.com/office/drawing/2014/main" id="{E7093C87-2EED-4EF1-B169-0F5A453030BD}"/>
               </a:ext>
             </a:extLst>
           </p:cNvPr>
@@ -709,7 +709,7 @@
           <p:cNvPr id="6" name="Номер слайда 5">
             <a:extLst>
               <a:ext uri="{FF2B5EF4-FFF2-40B4-BE49-F238E27FC236}">
-                <a16:creationId xmlns:a16="http://schemas.microsoft.com/office/drawing/2014/main" xmlns="" id="{41CB2C16-AD7A-42F5-87FF-D0B4F3581C9C}"/>
+                <a16:creationId xmlns="" xmlns:a16="http://schemas.microsoft.com/office/drawing/2014/main" id="{41CB2C16-AD7A-42F5-87FF-D0B4F3581C9C}"/>
               </a:ext>
             </a:extLst>
           </p:cNvPr>
@@ -768,7 +768,7 @@
           <p:cNvPr id="2" name="Заголовок 1">
             <a:extLst>
               <a:ext uri="{FF2B5EF4-FFF2-40B4-BE49-F238E27FC236}">
-                <a16:creationId xmlns:a16="http://schemas.microsoft.com/office/drawing/2014/main" xmlns="" id="{C888C4B7-DD0F-4065-9DA1-0111F6E1C18A}"/>
+                <a16:creationId xmlns="" xmlns:a16="http://schemas.microsoft.com/office/drawing/2014/main" id="{C888C4B7-DD0F-4065-9DA1-0111F6E1C18A}"/>
               </a:ext>
             </a:extLst>
           </p:cNvPr>
@@ -796,7 +796,7 @@
           <p:cNvPr id="3" name="Объект 2">
             <a:extLst>
               <a:ext uri="{FF2B5EF4-FFF2-40B4-BE49-F238E27FC236}">
-                <a16:creationId xmlns:a16="http://schemas.microsoft.com/office/drawing/2014/main" xmlns="" id="{70C26A80-7A85-4FF8-A770-0EA0D40ACCC6}"/>
+                <a16:creationId xmlns="" xmlns:a16="http://schemas.microsoft.com/office/drawing/2014/main" id="{70C26A80-7A85-4FF8-A770-0EA0D40ACCC6}"/>
               </a:ext>
             </a:extLst>
           </p:cNvPr>
@@ -853,7 +853,7 @@
           <p:cNvPr id="4" name="Дата 3">
             <a:extLst>
               <a:ext uri="{FF2B5EF4-FFF2-40B4-BE49-F238E27FC236}">
-                <a16:creationId xmlns:a16="http://schemas.microsoft.com/office/drawing/2014/main" xmlns="" id="{EE401449-4550-4CB7-90A5-A29BA6EF8DA5}"/>
+                <a16:creationId xmlns="" xmlns:a16="http://schemas.microsoft.com/office/drawing/2014/main" id="{EE401449-4550-4CB7-90A5-A29BA6EF8DA5}"/>
               </a:ext>
             </a:extLst>
           </p:cNvPr>
@@ -871,7 +871,7 @@
           <a:p>
             <a:fld id="{4ECA4943-241A-4077-AFED-06BF07B040DE}" type="datetimeFigureOut">
               <a:rPr lang="ru-RU" smtClean="0"/>
-              <a:t>18.11.2021</a:t>
+              <a:t>29.11.2021</a:t>
             </a:fld>
             <a:endParaRPr lang="ru-RU"/>
           </a:p>
@@ -882,7 +882,7 @@
           <p:cNvPr id="5" name="Нижний колонтитул 4">
             <a:extLst>
               <a:ext uri="{FF2B5EF4-FFF2-40B4-BE49-F238E27FC236}">
-                <a16:creationId xmlns:a16="http://schemas.microsoft.com/office/drawing/2014/main" xmlns="" id="{731C7D84-B4BB-4A05-914A-37D643E1D114}"/>
+                <a16:creationId xmlns="" xmlns:a16="http://schemas.microsoft.com/office/drawing/2014/main" id="{731C7D84-B4BB-4A05-914A-37D643E1D114}"/>
               </a:ext>
             </a:extLst>
           </p:cNvPr>
@@ -907,7 +907,7 @@
           <p:cNvPr id="6" name="Номер слайда 5">
             <a:extLst>
               <a:ext uri="{FF2B5EF4-FFF2-40B4-BE49-F238E27FC236}">
-                <a16:creationId xmlns:a16="http://schemas.microsoft.com/office/drawing/2014/main" xmlns="" id="{BE7CD94F-224B-4A03-BFC0-51898D51AE98}"/>
+                <a16:creationId xmlns="" xmlns:a16="http://schemas.microsoft.com/office/drawing/2014/main" id="{BE7CD94F-224B-4A03-BFC0-51898D51AE98}"/>
               </a:ext>
             </a:extLst>
           </p:cNvPr>
@@ -966,7 +966,7 @@
           <p:cNvPr id="2" name="Заголовок 1">
             <a:extLst>
               <a:ext uri="{FF2B5EF4-FFF2-40B4-BE49-F238E27FC236}">
-                <a16:creationId xmlns:a16="http://schemas.microsoft.com/office/drawing/2014/main" xmlns="" id="{9ED22326-27DB-478B-9F95-39355246A298}"/>
+                <a16:creationId xmlns="" xmlns:a16="http://schemas.microsoft.com/office/drawing/2014/main" id="{9ED22326-27DB-478B-9F95-39355246A298}"/>
               </a:ext>
             </a:extLst>
           </p:cNvPr>
@@ -1003,7 +1003,7 @@
           <p:cNvPr id="3" name="Текст 2">
             <a:extLst>
               <a:ext uri="{FF2B5EF4-FFF2-40B4-BE49-F238E27FC236}">
-                <a16:creationId xmlns:a16="http://schemas.microsoft.com/office/drawing/2014/main" xmlns="" id="{2D4ECB25-9604-48C9-B631-0199F854AC60}"/>
+                <a16:creationId xmlns="" xmlns:a16="http://schemas.microsoft.com/office/drawing/2014/main" id="{2D4ECB25-9604-48C9-B631-0199F854AC60}"/>
               </a:ext>
             </a:extLst>
           </p:cNvPr>
@@ -1128,7 +1128,7 @@
           <p:cNvPr id="4" name="Дата 3">
             <a:extLst>
               <a:ext uri="{FF2B5EF4-FFF2-40B4-BE49-F238E27FC236}">
-                <a16:creationId xmlns:a16="http://schemas.microsoft.com/office/drawing/2014/main" xmlns="" id="{70A46A6E-76DD-4CF2-BF84-2B6E27A1657F}"/>
+                <a16:creationId xmlns="" xmlns:a16="http://schemas.microsoft.com/office/drawing/2014/main" id="{70A46A6E-76DD-4CF2-BF84-2B6E27A1657F}"/>
               </a:ext>
             </a:extLst>
           </p:cNvPr>
@@ -1146,7 +1146,7 @@
           <a:p>
             <a:fld id="{4ECA4943-241A-4077-AFED-06BF07B040DE}" type="datetimeFigureOut">
               <a:rPr lang="ru-RU" smtClean="0"/>
-              <a:t>18.11.2021</a:t>
+              <a:t>29.11.2021</a:t>
             </a:fld>
             <a:endParaRPr lang="ru-RU"/>
           </a:p>
@@ -1157,7 +1157,7 @@
           <p:cNvPr id="5" name="Нижний колонтитул 4">
             <a:extLst>
               <a:ext uri="{FF2B5EF4-FFF2-40B4-BE49-F238E27FC236}">
-                <a16:creationId xmlns:a16="http://schemas.microsoft.com/office/drawing/2014/main" xmlns="" id="{C661B709-0B57-4AF8-BC9D-2BF3005C121E}"/>
+                <a16:creationId xmlns="" xmlns:a16="http://schemas.microsoft.com/office/drawing/2014/main" id="{C661B709-0B57-4AF8-BC9D-2BF3005C121E}"/>
               </a:ext>
             </a:extLst>
           </p:cNvPr>
@@ -1182,7 +1182,7 @@
           <p:cNvPr id="6" name="Номер слайда 5">
             <a:extLst>
               <a:ext uri="{FF2B5EF4-FFF2-40B4-BE49-F238E27FC236}">
-                <a16:creationId xmlns:a16="http://schemas.microsoft.com/office/drawing/2014/main" xmlns="" id="{DA3D7DAC-D344-4C1B-8A08-4E7643B8F3DB}"/>
+                <a16:creationId xmlns="" xmlns:a16="http://schemas.microsoft.com/office/drawing/2014/main" id="{DA3D7DAC-D344-4C1B-8A08-4E7643B8F3DB}"/>
               </a:ext>
             </a:extLst>
           </p:cNvPr>
@@ -1241,7 +1241,7 @@
           <p:cNvPr id="2" name="Заголовок 1">
             <a:extLst>
               <a:ext uri="{FF2B5EF4-FFF2-40B4-BE49-F238E27FC236}">
-                <a16:creationId xmlns:a16="http://schemas.microsoft.com/office/drawing/2014/main" xmlns="" id="{BFC6C4D3-3632-4D15-B69A-46A96400AB4F}"/>
+                <a16:creationId xmlns="" xmlns:a16="http://schemas.microsoft.com/office/drawing/2014/main" id="{BFC6C4D3-3632-4D15-B69A-46A96400AB4F}"/>
               </a:ext>
             </a:extLst>
           </p:cNvPr>
@@ -1269,7 +1269,7 @@
           <p:cNvPr id="3" name="Объект 2">
             <a:extLst>
               <a:ext uri="{FF2B5EF4-FFF2-40B4-BE49-F238E27FC236}">
-                <a16:creationId xmlns:a16="http://schemas.microsoft.com/office/drawing/2014/main" xmlns="" id="{48DAEF05-0CDB-41B9-BA28-1B09FE272B4E}"/>
+                <a16:creationId xmlns="" xmlns:a16="http://schemas.microsoft.com/office/drawing/2014/main" id="{48DAEF05-0CDB-41B9-BA28-1B09FE272B4E}"/>
               </a:ext>
             </a:extLst>
           </p:cNvPr>
@@ -1331,7 +1331,7 @@
           <p:cNvPr id="4" name="Объект 3">
             <a:extLst>
               <a:ext uri="{FF2B5EF4-FFF2-40B4-BE49-F238E27FC236}">
-                <a16:creationId xmlns:a16="http://schemas.microsoft.com/office/drawing/2014/main" xmlns="" id="{0ED2CC6A-67E5-4BFD-994E-FFECB5B1F46A}"/>
+                <a16:creationId xmlns="" xmlns:a16="http://schemas.microsoft.com/office/drawing/2014/main" id="{0ED2CC6A-67E5-4BFD-994E-FFECB5B1F46A}"/>
               </a:ext>
             </a:extLst>
           </p:cNvPr>
@@ -1393,7 +1393,7 @@
           <p:cNvPr id="5" name="Дата 4">
             <a:extLst>
               <a:ext uri="{FF2B5EF4-FFF2-40B4-BE49-F238E27FC236}">
-                <a16:creationId xmlns:a16="http://schemas.microsoft.com/office/drawing/2014/main" xmlns="" id="{ECC6C438-2791-498C-A5E9-142217D9529B}"/>
+                <a16:creationId xmlns="" xmlns:a16="http://schemas.microsoft.com/office/drawing/2014/main" id="{ECC6C438-2791-498C-A5E9-142217D9529B}"/>
               </a:ext>
             </a:extLst>
           </p:cNvPr>
@@ -1411,7 +1411,7 @@
           <a:p>
             <a:fld id="{4ECA4943-241A-4077-AFED-06BF07B040DE}" type="datetimeFigureOut">
               <a:rPr lang="ru-RU" smtClean="0"/>
-              <a:t>18.11.2021</a:t>
+              <a:t>29.11.2021</a:t>
             </a:fld>
             <a:endParaRPr lang="ru-RU"/>
           </a:p>
@@ -1422,7 +1422,7 @@
           <p:cNvPr id="6" name="Нижний колонтитул 5">
             <a:extLst>
               <a:ext uri="{FF2B5EF4-FFF2-40B4-BE49-F238E27FC236}">
-                <a16:creationId xmlns:a16="http://schemas.microsoft.com/office/drawing/2014/main" xmlns="" id="{C2B46C46-38F5-4118-A423-C26CFBB28F01}"/>
+                <a16:creationId xmlns="" xmlns:a16="http://schemas.microsoft.com/office/drawing/2014/main" id="{C2B46C46-38F5-4118-A423-C26CFBB28F01}"/>
               </a:ext>
             </a:extLst>
           </p:cNvPr>
@@ -1447,7 +1447,7 @@
           <p:cNvPr id="7" name="Номер слайда 6">
             <a:extLst>
               <a:ext uri="{FF2B5EF4-FFF2-40B4-BE49-F238E27FC236}">
-                <a16:creationId xmlns:a16="http://schemas.microsoft.com/office/drawing/2014/main" xmlns="" id="{4211E5A7-E13F-46A8-A63C-4BE1E2CD2638}"/>
+                <a16:creationId xmlns="" xmlns:a16="http://schemas.microsoft.com/office/drawing/2014/main" id="{4211E5A7-E13F-46A8-A63C-4BE1E2CD2638}"/>
               </a:ext>
             </a:extLst>
           </p:cNvPr>
@@ -1506,7 +1506,7 @@
           <p:cNvPr id="2" name="Заголовок 1">
             <a:extLst>
               <a:ext uri="{FF2B5EF4-FFF2-40B4-BE49-F238E27FC236}">
-                <a16:creationId xmlns:a16="http://schemas.microsoft.com/office/drawing/2014/main" xmlns="" id="{E9CB280B-3DE5-49E7-AA45-C47EC89A9FFF}"/>
+                <a16:creationId xmlns="" xmlns:a16="http://schemas.microsoft.com/office/drawing/2014/main" id="{E9CB280B-3DE5-49E7-AA45-C47EC89A9FFF}"/>
               </a:ext>
             </a:extLst>
           </p:cNvPr>
@@ -1539,7 +1539,7 @@
           <p:cNvPr id="3" name="Текст 2">
             <a:extLst>
               <a:ext uri="{FF2B5EF4-FFF2-40B4-BE49-F238E27FC236}">
-                <a16:creationId xmlns:a16="http://schemas.microsoft.com/office/drawing/2014/main" xmlns="" id="{E6F3192C-DD2E-4EAC-955F-04AB7956BEB9}"/>
+                <a16:creationId xmlns="" xmlns:a16="http://schemas.microsoft.com/office/drawing/2014/main" id="{E6F3192C-DD2E-4EAC-955F-04AB7956BEB9}"/>
               </a:ext>
             </a:extLst>
           </p:cNvPr>
@@ -1610,7 +1610,7 @@
           <p:cNvPr id="4" name="Объект 3">
             <a:extLst>
               <a:ext uri="{FF2B5EF4-FFF2-40B4-BE49-F238E27FC236}">
-                <a16:creationId xmlns:a16="http://schemas.microsoft.com/office/drawing/2014/main" xmlns="" id="{0A953F62-FD0D-41A7-8428-9B3459A9D00D}"/>
+                <a16:creationId xmlns="" xmlns:a16="http://schemas.microsoft.com/office/drawing/2014/main" id="{0A953F62-FD0D-41A7-8428-9B3459A9D00D}"/>
               </a:ext>
             </a:extLst>
           </p:cNvPr>
@@ -1672,7 +1672,7 @@
           <p:cNvPr id="5" name="Текст 4">
             <a:extLst>
               <a:ext uri="{FF2B5EF4-FFF2-40B4-BE49-F238E27FC236}">
-                <a16:creationId xmlns:a16="http://schemas.microsoft.com/office/drawing/2014/main" xmlns="" id="{95B59FC9-C21C-4D88-A534-8EF5FF896ED5}"/>
+                <a16:creationId xmlns="" xmlns:a16="http://schemas.microsoft.com/office/drawing/2014/main" id="{95B59FC9-C21C-4D88-A534-8EF5FF896ED5}"/>
               </a:ext>
             </a:extLst>
           </p:cNvPr>
@@ -1743,7 +1743,7 @@
           <p:cNvPr id="6" name="Объект 5">
             <a:extLst>
               <a:ext uri="{FF2B5EF4-FFF2-40B4-BE49-F238E27FC236}">
-                <a16:creationId xmlns:a16="http://schemas.microsoft.com/office/drawing/2014/main" xmlns="" id="{C7219CF7-D2F8-49A3-8221-A84139769F41}"/>
+                <a16:creationId xmlns="" xmlns:a16="http://schemas.microsoft.com/office/drawing/2014/main" id="{C7219CF7-D2F8-49A3-8221-A84139769F41}"/>
               </a:ext>
             </a:extLst>
           </p:cNvPr>
@@ -1805,7 +1805,7 @@
           <p:cNvPr id="7" name="Дата 6">
             <a:extLst>
               <a:ext uri="{FF2B5EF4-FFF2-40B4-BE49-F238E27FC236}">
-                <a16:creationId xmlns:a16="http://schemas.microsoft.com/office/drawing/2014/main" xmlns="" id="{4CDF6083-5D07-408D-8354-327D3A5F5D23}"/>
+                <a16:creationId xmlns="" xmlns:a16="http://schemas.microsoft.com/office/drawing/2014/main" id="{4CDF6083-5D07-408D-8354-327D3A5F5D23}"/>
               </a:ext>
             </a:extLst>
           </p:cNvPr>
@@ -1823,7 +1823,7 @@
           <a:p>
             <a:fld id="{4ECA4943-241A-4077-AFED-06BF07B040DE}" type="datetimeFigureOut">
               <a:rPr lang="ru-RU" smtClean="0"/>
-              <a:t>18.11.2021</a:t>
+              <a:t>29.11.2021</a:t>
             </a:fld>
             <a:endParaRPr lang="ru-RU"/>
           </a:p>
@@ -1834,7 +1834,7 @@
           <p:cNvPr id="8" name="Нижний колонтитул 7">
             <a:extLst>
               <a:ext uri="{FF2B5EF4-FFF2-40B4-BE49-F238E27FC236}">
-                <a16:creationId xmlns:a16="http://schemas.microsoft.com/office/drawing/2014/main" xmlns="" id="{CCCFA2CA-1BE3-4823-9AF4-4D5C4B503055}"/>
+                <a16:creationId xmlns="" xmlns:a16="http://schemas.microsoft.com/office/drawing/2014/main" id="{CCCFA2CA-1BE3-4823-9AF4-4D5C4B503055}"/>
               </a:ext>
             </a:extLst>
           </p:cNvPr>
@@ -1859,7 +1859,7 @@
           <p:cNvPr id="9" name="Номер слайда 8">
             <a:extLst>
               <a:ext uri="{FF2B5EF4-FFF2-40B4-BE49-F238E27FC236}">
-                <a16:creationId xmlns:a16="http://schemas.microsoft.com/office/drawing/2014/main" xmlns="" id="{D6D06A6D-7207-4952-9F7F-18BD155304FB}"/>
+                <a16:creationId xmlns="" xmlns:a16="http://schemas.microsoft.com/office/drawing/2014/main" id="{D6D06A6D-7207-4952-9F7F-18BD155304FB}"/>
               </a:ext>
             </a:extLst>
           </p:cNvPr>
@@ -1918,7 +1918,7 @@
           <p:cNvPr id="2" name="Заголовок 1">
             <a:extLst>
               <a:ext uri="{FF2B5EF4-FFF2-40B4-BE49-F238E27FC236}">
-                <a16:creationId xmlns:a16="http://schemas.microsoft.com/office/drawing/2014/main" xmlns="" id="{22728902-87FE-403E-AD45-8A54ED81BBA5}"/>
+                <a16:creationId xmlns="" xmlns:a16="http://schemas.microsoft.com/office/drawing/2014/main" id="{22728902-87FE-403E-AD45-8A54ED81BBA5}"/>
               </a:ext>
             </a:extLst>
           </p:cNvPr>
@@ -1946,7 +1946,7 @@
           <p:cNvPr id="3" name="Дата 2">
             <a:extLst>
               <a:ext uri="{FF2B5EF4-FFF2-40B4-BE49-F238E27FC236}">
-                <a16:creationId xmlns:a16="http://schemas.microsoft.com/office/drawing/2014/main" xmlns="" id="{43E771F8-56A8-435F-9DFF-A55CF3E258E8}"/>
+                <a16:creationId xmlns="" xmlns:a16="http://schemas.microsoft.com/office/drawing/2014/main" id="{43E771F8-56A8-435F-9DFF-A55CF3E258E8}"/>
               </a:ext>
             </a:extLst>
           </p:cNvPr>
@@ -1964,7 +1964,7 @@
           <a:p>
             <a:fld id="{4ECA4943-241A-4077-AFED-06BF07B040DE}" type="datetimeFigureOut">
               <a:rPr lang="ru-RU" smtClean="0"/>
-              <a:t>18.11.2021</a:t>
+              <a:t>29.11.2021</a:t>
             </a:fld>
             <a:endParaRPr lang="ru-RU"/>
           </a:p>
@@ -1975,7 +1975,7 @@
           <p:cNvPr id="4" name="Нижний колонтитул 3">
             <a:extLst>
               <a:ext uri="{FF2B5EF4-FFF2-40B4-BE49-F238E27FC236}">
-                <a16:creationId xmlns:a16="http://schemas.microsoft.com/office/drawing/2014/main" xmlns="" id="{32AE2183-D7F9-4B55-B1C5-DCB40024DE15}"/>
+                <a16:creationId xmlns="" xmlns:a16="http://schemas.microsoft.com/office/drawing/2014/main" id="{32AE2183-D7F9-4B55-B1C5-DCB40024DE15}"/>
               </a:ext>
             </a:extLst>
           </p:cNvPr>
@@ -2000,7 +2000,7 @@
           <p:cNvPr id="5" name="Номер слайда 4">
             <a:extLst>
               <a:ext uri="{FF2B5EF4-FFF2-40B4-BE49-F238E27FC236}">
-                <a16:creationId xmlns:a16="http://schemas.microsoft.com/office/drawing/2014/main" xmlns="" id="{0055C120-B600-43F1-96C1-638A58B555A5}"/>
+                <a16:creationId xmlns="" xmlns:a16="http://schemas.microsoft.com/office/drawing/2014/main" id="{0055C120-B600-43F1-96C1-638A58B555A5}"/>
               </a:ext>
             </a:extLst>
           </p:cNvPr>
@@ -2059,7 +2059,7 @@
           <p:cNvPr id="2" name="Дата 1">
             <a:extLst>
               <a:ext uri="{FF2B5EF4-FFF2-40B4-BE49-F238E27FC236}">
-                <a16:creationId xmlns:a16="http://schemas.microsoft.com/office/drawing/2014/main" xmlns="" id="{761D4387-5011-4A8E-A1B1-974DC8E7A4A0}"/>
+                <a16:creationId xmlns="" xmlns:a16="http://schemas.microsoft.com/office/drawing/2014/main" id="{761D4387-5011-4A8E-A1B1-974DC8E7A4A0}"/>
               </a:ext>
             </a:extLst>
           </p:cNvPr>
@@ -2077,7 +2077,7 @@
           <a:p>
             <a:fld id="{4ECA4943-241A-4077-AFED-06BF07B040DE}" type="datetimeFigureOut">
               <a:rPr lang="ru-RU" smtClean="0"/>
-              <a:t>18.11.2021</a:t>
+              <a:t>29.11.2021</a:t>
             </a:fld>
             <a:endParaRPr lang="ru-RU"/>
           </a:p>
@@ -2088,7 +2088,7 @@
           <p:cNvPr id="3" name="Нижний колонтитул 2">
             <a:extLst>
               <a:ext uri="{FF2B5EF4-FFF2-40B4-BE49-F238E27FC236}">
-                <a16:creationId xmlns:a16="http://schemas.microsoft.com/office/drawing/2014/main" xmlns="" id="{B4AB7758-832D-40F7-8B05-57E3C4691298}"/>
+                <a16:creationId xmlns="" xmlns:a16="http://schemas.microsoft.com/office/drawing/2014/main" id="{B4AB7758-832D-40F7-8B05-57E3C4691298}"/>
               </a:ext>
             </a:extLst>
           </p:cNvPr>
@@ -2113,7 +2113,7 @@
           <p:cNvPr id="4" name="Номер слайда 3">
             <a:extLst>
               <a:ext uri="{FF2B5EF4-FFF2-40B4-BE49-F238E27FC236}">
-                <a16:creationId xmlns:a16="http://schemas.microsoft.com/office/drawing/2014/main" xmlns="" id="{6FE1468F-4166-4BB7-A8BB-A17FD8F14368}"/>
+                <a16:creationId xmlns="" xmlns:a16="http://schemas.microsoft.com/office/drawing/2014/main" id="{6FE1468F-4166-4BB7-A8BB-A17FD8F14368}"/>
               </a:ext>
             </a:extLst>
           </p:cNvPr>
@@ -2172,7 +2172,7 @@
           <p:cNvPr id="2" name="Заголовок 1">
             <a:extLst>
               <a:ext uri="{FF2B5EF4-FFF2-40B4-BE49-F238E27FC236}">
-                <a16:creationId xmlns:a16="http://schemas.microsoft.com/office/drawing/2014/main" xmlns="" id="{A082DB93-6274-41EB-ABEF-9B404F13A4E3}"/>
+                <a16:creationId xmlns="" xmlns:a16="http://schemas.microsoft.com/office/drawing/2014/main" id="{A082DB93-6274-41EB-ABEF-9B404F13A4E3}"/>
               </a:ext>
             </a:extLst>
           </p:cNvPr>
@@ -2209,7 +2209,7 @@
           <p:cNvPr id="3" name="Объект 2">
             <a:extLst>
               <a:ext uri="{FF2B5EF4-FFF2-40B4-BE49-F238E27FC236}">
-                <a16:creationId xmlns:a16="http://schemas.microsoft.com/office/drawing/2014/main" xmlns="" id="{F8A38A73-AA9B-40DA-B450-845128634D01}"/>
+                <a16:creationId xmlns="" xmlns:a16="http://schemas.microsoft.com/office/drawing/2014/main" id="{F8A38A73-AA9B-40DA-B450-845128634D01}"/>
               </a:ext>
             </a:extLst>
           </p:cNvPr>
@@ -2299,7 +2299,7 @@
           <p:cNvPr id="4" name="Текст 3">
             <a:extLst>
               <a:ext uri="{FF2B5EF4-FFF2-40B4-BE49-F238E27FC236}">
-                <a16:creationId xmlns:a16="http://schemas.microsoft.com/office/drawing/2014/main" xmlns="" id="{EDDE56B0-8063-4F70-A63E-0DD7FEB19025}"/>
+                <a16:creationId xmlns="" xmlns:a16="http://schemas.microsoft.com/office/drawing/2014/main" id="{EDDE56B0-8063-4F70-A63E-0DD7FEB19025}"/>
               </a:ext>
             </a:extLst>
           </p:cNvPr>
@@ -2370,7 +2370,7 @@
           <p:cNvPr id="5" name="Дата 4">
             <a:extLst>
               <a:ext uri="{FF2B5EF4-FFF2-40B4-BE49-F238E27FC236}">
-                <a16:creationId xmlns:a16="http://schemas.microsoft.com/office/drawing/2014/main" xmlns="" id="{ADE6022F-544F-4557-8F88-D986F335BAEF}"/>
+                <a16:creationId xmlns="" xmlns:a16="http://schemas.microsoft.com/office/drawing/2014/main" id="{ADE6022F-544F-4557-8F88-D986F335BAEF}"/>
               </a:ext>
             </a:extLst>
           </p:cNvPr>
@@ -2388,7 +2388,7 @@
           <a:p>
             <a:fld id="{4ECA4943-241A-4077-AFED-06BF07B040DE}" type="datetimeFigureOut">
               <a:rPr lang="ru-RU" smtClean="0"/>
-              <a:t>18.11.2021</a:t>
+              <a:t>29.11.2021</a:t>
             </a:fld>
             <a:endParaRPr lang="ru-RU"/>
           </a:p>
@@ -2399,7 +2399,7 @@
           <p:cNvPr id="6" name="Нижний колонтитул 5">
             <a:extLst>
               <a:ext uri="{FF2B5EF4-FFF2-40B4-BE49-F238E27FC236}">
-                <a16:creationId xmlns:a16="http://schemas.microsoft.com/office/drawing/2014/main" xmlns="" id="{74F785A1-2F71-44CD-B056-0E161110B535}"/>
+                <a16:creationId xmlns="" xmlns:a16="http://schemas.microsoft.com/office/drawing/2014/main" id="{74F785A1-2F71-44CD-B056-0E161110B535}"/>
               </a:ext>
             </a:extLst>
           </p:cNvPr>
@@ -2424,7 +2424,7 @@
           <p:cNvPr id="7" name="Номер слайда 6">
             <a:extLst>
               <a:ext uri="{FF2B5EF4-FFF2-40B4-BE49-F238E27FC236}">
-                <a16:creationId xmlns:a16="http://schemas.microsoft.com/office/drawing/2014/main" xmlns="" id="{7A9ABA81-12D6-4D59-9056-2F68C98934A1}"/>
+                <a16:creationId xmlns="" xmlns:a16="http://schemas.microsoft.com/office/drawing/2014/main" id="{7A9ABA81-12D6-4D59-9056-2F68C98934A1}"/>
               </a:ext>
             </a:extLst>
           </p:cNvPr>
@@ -2483,7 +2483,7 @@
           <p:cNvPr id="2" name="Заголовок 1">
             <a:extLst>
               <a:ext uri="{FF2B5EF4-FFF2-40B4-BE49-F238E27FC236}">
-                <a16:creationId xmlns:a16="http://schemas.microsoft.com/office/drawing/2014/main" xmlns="" id="{B92D5656-6D49-4C82-AEA1-A704E7A6A6F1}"/>
+                <a16:creationId xmlns="" xmlns:a16="http://schemas.microsoft.com/office/drawing/2014/main" id="{B92D5656-6D49-4C82-AEA1-A704E7A6A6F1}"/>
               </a:ext>
             </a:extLst>
           </p:cNvPr>
@@ -2520,7 +2520,7 @@
           <p:cNvPr id="3" name="Рисунок 2">
             <a:extLst>
               <a:ext uri="{FF2B5EF4-FFF2-40B4-BE49-F238E27FC236}">
-                <a16:creationId xmlns:a16="http://schemas.microsoft.com/office/drawing/2014/main" xmlns="" id="{9D2DF2E8-42D6-4B82-A6D1-FD250E3A6743}"/>
+                <a16:creationId xmlns="" xmlns:a16="http://schemas.microsoft.com/office/drawing/2014/main" id="{9D2DF2E8-42D6-4B82-A6D1-FD250E3A6743}"/>
               </a:ext>
             </a:extLst>
           </p:cNvPr>
@@ -2587,7 +2587,7 @@
           <p:cNvPr id="4" name="Текст 3">
             <a:extLst>
               <a:ext uri="{FF2B5EF4-FFF2-40B4-BE49-F238E27FC236}">
-                <a16:creationId xmlns:a16="http://schemas.microsoft.com/office/drawing/2014/main" xmlns="" id="{62B58ABA-0F52-410A-A145-50F0038BB7D5}"/>
+                <a16:creationId xmlns="" xmlns:a16="http://schemas.microsoft.com/office/drawing/2014/main" id="{62B58ABA-0F52-410A-A145-50F0038BB7D5}"/>
               </a:ext>
             </a:extLst>
           </p:cNvPr>
@@ -2658,7 +2658,7 @@
           <p:cNvPr id="5" name="Дата 4">
             <a:extLst>
               <a:ext uri="{FF2B5EF4-FFF2-40B4-BE49-F238E27FC236}">
-                <a16:creationId xmlns:a16="http://schemas.microsoft.com/office/drawing/2014/main" xmlns="" id="{5FEDD304-7EB8-4362-BEB2-08FE0861EE4E}"/>
+                <a16:creationId xmlns="" xmlns:a16="http://schemas.microsoft.com/office/drawing/2014/main" id="{5FEDD304-7EB8-4362-BEB2-08FE0861EE4E}"/>
               </a:ext>
             </a:extLst>
           </p:cNvPr>
@@ -2676,7 +2676,7 @@
           <a:p>
             <a:fld id="{4ECA4943-241A-4077-AFED-06BF07B040DE}" type="datetimeFigureOut">
               <a:rPr lang="ru-RU" smtClean="0"/>
-              <a:t>18.11.2021</a:t>
+              <a:t>29.11.2021</a:t>
             </a:fld>
             <a:endParaRPr lang="ru-RU"/>
           </a:p>
@@ -2687,7 +2687,7 @@
           <p:cNvPr id="6" name="Нижний колонтитул 5">
             <a:extLst>
               <a:ext uri="{FF2B5EF4-FFF2-40B4-BE49-F238E27FC236}">
-                <a16:creationId xmlns:a16="http://schemas.microsoft.com/office/drawing/2014/main" xmlns="" id="{244F16F1-7D48-41EE-A93A-804EEE132A64}"/>
+                <a16:creationId xmlns="" xmlns:a16="http://schemas.microsoft.com/office/drawing/2014/main" id="{244F16F1-7D48-41EE-A93A-804EEE132A64}"/>
               </a:ext>
             </a:extLst>
           </p:cNvPr>
@@ -2712,7 +2712,7 @@
           <p:cNvPr id="7" name="Номер слайда 6">
             <a:extLst>
               <a:ext uri="{FF2B5EF4-FFF2-40B4-BE49-F238E27FC236}">
-                <a16:creationId xmlns:a16="http://schemas.microsoft.com/office/drawing/2014/main" xmlns="" id="{671E4888-B581-405C-9EA3-29E840FEFB9E}"/>
+                <a16:creationId xmlns="" xmlns:a16="http://schemas.microsoft.com/office/drawing/2014/main" id="{671E4888-B581-405C-9EA3-29E840FEFB9E}"/>
               </a:ext>
             </a:extLst>
           </p:cNvPr>
@@ -2776,7 +2776,7 @@
           <p:cNvPr id="2" name="Заголовок 1">
             <a:extLst>
               <a:ext uri="{FF2B5EF4-FFF2-40B4-BE49-F238E27FC236}">
-                <a16:creationId xmlns:a16="http://schemas.microsoft.com/office/drawing/2014/main" xmlns="" id="{5F08A6EB-C1DE-480C-96A2-D8BC0486FBBD}"/>
+                <a16:creationId xmlns="" xmlns:a16="http://schemas.microsoft.com/office/drawing/2014/main" id="{5F08A6EB-C1DE-480C-96A2-D8BC0486FBBD}"/>
               </a:ext>
             </a:extLst>
           </p:cNvPr>
@@ -2814,7 +2814,7 @@
           <p:cNvPr id="3" name="Текст 2">
             <a:extLst>
               <a:ext uri="{FF2B5EF4-FFF2-40B4-BE49-F238E27FC236}">
-                <a16:creationId xmlns:a16="http://schemas.microsoft.com/office/drawing/2014/main" xmlns="" id="{FBCDE393-B9CA-46CC-9172-34D0178F3451}"/>
+                <a16:creationId xmlns="" xmlns:a16="http://schemas.microsoft.com/office/drawing/2014/main" id="{FBCDE393-B9CA-46CC-9172-34D0178F3451}"/>
               </a:ext>
             </a:extLst>
           </p:cNvPr>
@@ -2881,7 +2881,7 @@
           <p:cNvPr id="4" name="Дата 3">
             <a:extLst>
               <a:ext uri="{FF2B5EF4-FFF2-40B4-BE49-F238E27FC236}">
-                <a16:creationId xmlns:a16="http://schemas.microsoft.com/office/drawing/2014/main" xmlns="" id="{74737011-F677-4F15-B655-97D023B24B22}"/>
+                <a16:creationId xmlns="" xmlns:a16="http://schemas.microsoft.com/office/drawing/2014/main" id="{74737011-F677-4F15-B655-97D023B24B22}"/>
               </a:ext>
             </a:extLst>
           </p:cNvPr>
@@ -2917,7 +2917,7 @@
           <a:p>
             <a:fld id="{4ECA4943-241A-4077-AFED-06BF07B040DE}" type="datetimeFigureOut">
               <a:rPr lang="ru-RU" smtClean="0"/>
-              <a:t>18.11.2021</a:t>
+              <a:t>29.11.2021</a:t>
             </a:fld>
             <a:endParaRPr lang="ru-RU"/>
           </a:p>
@@ -2928,7 +2928,7 @@
           <p:cNvPr id="5" name="Нижний колонтитул 4">
             <a:extLst>
               <a:ext uri="{FF2B5EF4-FFF2-40B4-BE49-F238E27FC236}">
-                <a16:creationId xmlns:a16="http://schemas.microsoft.com/office/drawing/2014/main" xmlns="" id="{E208F586-7701-4AFC-9389-268931E84D54}"/>
+                <a16:creationId xmlns="" xmlns:a16="http://schemas.microsoft.com/office/drawing/2014/main" id="{E208F586-7701-4AFC-9389-268931E84D54}"/>
               </a:ext>
             </a:extLst>
           </p:cNvPr>
@@ -2971,7 +2971,7 @@
           <p:cNvPr id="6" name="Номер слайда 5">
             <a:extLst>
               <a:ext uri="{FF2B5EF4-FFF2-40B4-BE49-F238E27FC236}">
-                <a16:creationId xmlns:a16="http://schemas.microsoft.com/office/drawing/2014/main" xmlns="" id="{CFD00EFB-53F3-4A02-8EC2-B9A8FEC11978}"/>
+                <a16:creationId xmlns="" xmlns:a16="http://schemas.microsoft.com/office/drawing/2014/main" id="{CFD00EFB-53F3-4A02-8EC2-B9A8FEC11978}"/>
               </a:ext>
             </a:extLst>
           </p:cNvPr>
@@ -3339,7 +3339,7 @@
           <p:cNvPr id="2" name="Заголовок 1">
             <a:extLst>
               <a:ext uri="{FF2B5EF4-FFF2-40B4-BE49-F238E27FC236}">
-                <a16:creationId xmlns:a16="http://schemas.microsoft.com/office/drawing/2014/main" xmlns="" id="{518F947D-3121-42C3-BEFE-BB6601BC1CCB}"/>
+                <a16:creationId xmlns="" xmlns:a16="http://schemas.microsoft.com/office/drawing/2014/main" id="{518F947D-3121-42C3-BEFE-BB6601BC1CCB}"/>
               </a:ext>
             </a:extLst>
           </p:cNvPr>
@@ -3376,7 +3376,7 @@
           <p:cNvPr id="3" name="Подзаголовок 2">
             <a:extLst>
               <a:ext uri="{FF2B5EF4-FFF2-40B4-BE49-F238E27FC236}">
-                <a16:creationId xmlns:a16="http://schemas.microsoft.com/office/drawing/2014/main" xmlns="" id="{734D6897-05EB-4E07-BD0B-9EA4DBC1B568}"/>
+                <a16:creationId xmlns="" xmlns:a16="http://schemas.microsoft.com/office/drawing/2014/main" id="{734D6897-05EB-4E07-BD0B-9EA4DBC1B568}"/>
               </a:ext>
             </a:extLst>
           </p:cNvPr>
@@ -3416,10 +3416,16 @@
           </a:p>
           <a:p>
             <a:r>
+              <a:rPr lang="ru-RU" dirty="0" smtClean="0">
+                <a:latin typeface="Comic Sans MS" panose="030F0702030302020204" pitchFamily="66" charset="0"/>
+              </a:rPr>
+              <a:t>Королёва </a:t>
+            </a:r>
+            <a:r>
               <a:rPr lang="ru-RU" dirty="0">
                 <a:latin typeface="Comic Sans MS" panose="030F0702030302020204" pitchFamily="66" charset="0"/>
               </a:rPr>
-              <a:t>Королева В.А.</a:t>
+              <a:t>В.А.</a:t>
             </a:r>
           </a:p>
           <a:p>
@@ -3437,7 +3443,7 @@
           <p:cNvPr id="5" name="Рисунок 4">
             <a:extLst>
               <a:ext uri="{FF2B5EF4-FFF2-40B4-BE49-F238E27FC236}">
-                <a16:creationId xmlns:a16="http://schemas.microsoft.com/office/drawing/2014/main" xmlns="" id="{3A31AF7A-1F91-4ABC-AFBD-8B5C97433004}"/>
+                <a16:creationId xmlns="" xmlns:a16="http://schemas.microsoft.com/office/drawing/2014/main" id="{3A31AF7A-1F91-4ABC-AFBD-8B5C97433004}"/>
               </a:ext>
             </a:extLst>
           </p:cNvPr>
@@ -3550,7 +3556,7 @@
           <p:cNvPr id="2" name="Заголовок 1">
             <a:extLst>
               <a:ext uri="{FF2B5EF4-FFF2-40B4-BE49-F238E27FC236}">
-                <a16:creationId xmlns:a16="http://schemas.microsoft.com/office/drawing/2014/main" xmlns="" id="{E7310F3E-DD22-4E64-8428-41A460D11988}"/>
+                <a16:creationId xmlns="" xmlns:a16="http://schemas.microsoft.com/office/drawing/2014/main" id="{E7310F3E-DD22-4E64-8428-41A460D11988}"/>
               </a:ext>
             </a:extLst>
           </p:cNvPr>
@@ -3594,7 +3600,7 @@
           <p:cNvPr id="3" name="Объект 2">
             <a:extLst>
               <a:ext uri="{FF2B5EF4-FFF2-40B4-BE49-F238E27FC236}">
-                <a16:creationId xmlns:a16="http://schemas.microsoft.com/office/drawing/2014/main" xmlns="" id="{210D4AFA-D9BF-4026-B378-AD7DD240E6C4}"/>
+                <a16:creationId xmlns="" xmlns:a16="http://schemas.microsoft.com/office/drawing/2014/main" id="{210D4AFA-D9BF-4026-B378-AD7DD240E6C4}"/>
               </a:ext>
             </a:extLst>
           </p:cNvPr>
@@ -3706,7 +3712,7 @@
           <p:cNvPr id="2" name="Заголовок 1">
             <a:extLst>
               <a:ext uri="{FF2B5EF4-FFF2-40B4-BE49-F238E27FC236}">
-                <a16:creationId xmlns:a16="http://schemas.microsoft.com/office/drawing/2014/main" xmlns="" id="{E7310F3E-DD22-4E64-8428-41A460D11988}"/>
+                <a16:creationId xmlns="" xmlns:a16="http://schemas.microsoft.com/office/drawing/2014/main" id="{E7310F3E-DD22-4E64-8428-41A460D11988}"/>
               </a:ext>
             </a:extLst>
           </p:cNvPr>
@@ -3750,7 +3756,7 @@
           <p:cNvPr id="3" name="Объект 2">
             <a:extLst>
               <a:ext uri="{FF2B5EF4-FFF2-40B4-BE49-F238E27FC236}">
-                <a16:creationId xmlns:a16="http://schemas.microsoft.com/office/drawing/2014/main" xmlns="" id="{210D4AFA-D9BF-4026-B378-AD7DD240E6C4}"/>
+                <a16:creationId xmlns="" xmlns:a16="http://schemas.microsoft.com/office/drawing/2014/main" id="{210D4AFA-D9BF-4026-B378-AD7DD240E6C4}"/>
               </a:ext>
             </a:extLst>
           </p:cNvPr>
@@ -3949,7 +3955,7 @@
           <p:cNvPr id="2" name="Заголовок 1">
             <a:extLst>
               <a:ext uri="{FF2B5EF4-FFF2-40B4-BE49-F238E27FC236}">
-                <a16:creationId xmlns:a16="http://schemas.microsoft.com/office/drawing/2014/main" xmlns="" id="{E7310F3E-DD22-4E64-8428-41A460D11988}"/>
+                <a16:creationId xmlns="" xmlns:a16="http://schemas.microsoft.com/office/drawing/2014/main" id="{E7310F3E-DD22-4E64-8428-41A460D11988}"/>
               </a:ext>
             </a:extLst>
           </p:cNvPr>
@@ -3988,14 +3994,14 @@
           </a:p>
         </p:txBody>
       </p:sp>
-      <mc:AlternateContent xmlns:mc="http://schemas.openxmlformats.org/markup-compatibility/2006">
-        <mc:Choice xmlns:a14="http://schemas.microsoft.com/office/drawing/2010/main" Requires="a14">
+      <mc:AlternateContent xmlns:mc="http://schemas.openxmlformats.org/markup-compatibility/2006" xmlns:a14="http://schemas.microsoft.com/office/drawing/2010/main">
+        <mc:Choice Requires="a14">
           <p:sp>
             <p:nvSpPr>
               <p:cNvPr id="3" name="Объект 2">
                 <a:extLst>
                   <a:ext uri="{FF2B5EF4-FFF2-40B4-BE49-F238E27FC236}">
-                    <a16:creationId xmlns:a16="http://schemas.microsoft.com/office/drawing/2014/main" xmlns="" id="{210D4AFA-D9BF-4026-B378-AD7DD240E6C4}"/>
+                    <a16:creationId xmlns="" xmlns:a16="http://schemas.microsoft.com/office/drawing/2014/main" id="{210D4AFA-D9BF-4026-B378-AD7DD240E6C4}"/>
                   </a:ext>
                 </a:extLst>
               </p:cNvPr>
@@ -4399,7 +4405,7 @@
             </p:txBody>
           </p:sp>
         </mc:Choice>
-        <mc:Fallback>
+        <mc:Fallback xmlns="">
           <p:sp>
             <p:nvSpPr>
               <p:cNvPr id="3" name="Объект 2">
@@ -4777,7 +4783,7 @@
           <p:cNvPr id="12" name="Рисунок 11">
             <a:extLst>
               <a:ext uri="{FF2B5EF4-FFF2-40B4-BE49-F238E27FC236}">
-                <a16:creationId xmlns:a16="http://schemas.microsoft.com/office/drawing/2014/main" xmlns="" id="{72D99436-D4F2-4145-B199-BD86FFAF802A}"/>
+                <a16:creationId xmlns="" xmlns:a16="http://schemas.microsoft.com/office/drawing/2014/main" id="{72D99436-D4F2-4145-B199-BD86FFAF802A}"/>
               </a:ext>
             </a:extLst>
           </p:cNvPr>
@@ -4807,7 +4813,7 @@
           <p:cNvPr id="13" name="Рисунок 12">
             <a:extLst>
               <a:ext uri="{FF2B5EF4-FFF2-40B4-BE49-F238E27FC236}">
-                <a16:creationId xmlns:a16="http://schemas.microsoft.com/office/drawing/2014/main" xmlns="" id="{FB870E09-61DB-426A-8F2A-D65638D14259}"/>
+                <a16:creationId xmlns="" xmlns:a16="http://schemas.microsoft.com/office/drawing/2014/main" id="{FB870E09-61DB-426A-8F2A-D65638D14259}"/>
               </a:ext>
             </a:extLst>
           </p:cNvPr>
@@ -4950,7 +4956,7 @@
           <p:cNvPr id="2" name="Заголовок 1">
             <a:extLst>
               <a:ext uri="{FF2B5EF4-FFF2-40B4-BE49-F238E27FC236}">
-                <a16:creationId xmlns:a16="http://schemas.microsoft.com/office/drawing/2014/main" xmlns="" id="{E7310F3E-DD22-4E64-8428-41A460D11988}"/>
+                <a16:creationId xmlns="" xmlns:a16="http://schemas.microsoft.com/office/drawing/2014/main" id="{E7310F3E-DD22-4E64-8428-41A460D11988}"/>
               </a:ext>
             </a:extLst>
           </p:cNvPr>
@@ -4989,14 +4995,14 @@
           </a:p>
         </p:txBody>
       </p:sp>
-      <mc:AlternateContent xmlns:mc="http://schemas.openxmlformats.org/markup-compatibility/2006">
-        <mc:Choice xmlns:a14="http://schemas.microsoft.com/office/drawing/2010/main" Requires="a14">
+      <mc:AlternateContent xmlns:mc="http://schemas.openxmlformats.org/markup-compatibility/2006" xmlns:a14="http://schemas.microsoft.com/office/drawing/2010/main">
+        <mc:Choice Requires="a14">
           <p:sp>
             <p:nvSpPr>
               <p:cNvPr id="3" name="Объект 2">
                 <a:extLst>
                   <a:ext uri="{FF2B5EF4-FFF2-40B4-BE49-F238E27FC236}">
-                    <a16:creationId xmlns:a16="http://schemas.microsoft.com/office/drawing/2014/main" xmlns="" id="{210D4AFA-D9BF-4026-B378-AD7DD240E6C4}"/>
+                    <a16:creationId xmlns="" xmlns:a16="http://schemas.microsoft.com/office/drawing/2014/main" id="{210D4AFA-D9BF-4026-B378-AD7DD240E6C4}"/>
                   </a:ext>
                 </a:extLst>
               </p:cNvPr>
@@ -5391,7 +5397,7 @@
             </p:txBody>
           </p:sp>
         </mc:Choice>
-        <mc:Fallback>
+        <mc:Fallback xmlns="">
           <p:sp>
             <p:nvSpPr>
               <p:cNvPr id="3" name="Объект 2">
@@ -5769,7 +5775,7 @@
           <p:cNvPr id="12" name="Рисунок 11">
             <a:extLst>
               <a:ext uri="{FF2B5EF4-FFF2-40B4-BE49-F238E27FC236}">
-                <a16:creationId xmlns:a16="http://schemas.microsoft.com/office/drawing/2014/main" xmlns="" id="{72D99436-D4F2-4145-B199-BD86FFAF802A}"/>
+                <a16:creationId xmlns="" xmlns:a16="http://schemas.microsoft.com/office/drawing/2014/main" id="{72D99436-D4F2-4145-B199-BD86FFAF802A}"/>
               </a:ext>
             </a:extLst>
           </p:cNvPr>
@@ -5799,7 +5805,7 @@
           <p:cNvPr id="13" name="Рисунок 12">
             <a:extLst>
               <a:ext uri="{FF2B5EF4-FFF2-40B4-BE49-F238E27FC236}">
-                <a16:creationId xmlns:a16="http://schemas.microsoft.com/office/drawing/2014/main" xmlns="" id="{FB870E09-61DB-426A-8F2A-D65638D14259}"/>
+                <a16:creationId xmlns="" xmlns:a16="http://schemas.microsoft.com/office/drawing/2014/main" id="{FB870E09-61DB-426A-8F2A-D65638D14259}"/>
               </a:ext>
             </a:extLst>
           </p:cNvPr>
@@ -5942,7 +5948,7 @@
           <p:cNvPr id="2" name="Заголовок 1">
             <a:extLst>
               <a:ext uri="{FF2B5EF4-FFF2-40B4-BE49-F238E27FC236}">
-                <a16:creationId xmlns:a16="http://schemas.microsoft.com/office/drawing/2014/main" xmlns="" id="{E7310F3E-DD22-4E64-8428-41A460D11988}"/>
+                <a16:creationId xmlns="" xmlns:a16="http://schemas.microsoft.com/office/drawing/2014/main" id="{E7310F3E-DD22-4E64-8428-41A460D11988}"/>
               </a:ext>
             </a:extLst>
           </p:cNvPr>
@@ -5980,7 +5986,7 @@
           <p:cNvPr id="3" name="Объект 2">
             <a:extLst>
               <a:ext uri="{FF2B5EF4-FFF2-40B4-BE49-F238E27FC236}">
-                <a16:creationId xmlns:a16="http://schemas.microsoft.com/office/drawing/2014/main" xmlns="" id="{210D4AFA-D9BF-4026-B378-AD7DD240E6C4}"/>
+                <a16:creationId xmlns="" xmlns:a16="http://schemas.microsoft.com/office/drawing/2014/main" id="{210D4AFA-D9BF-4026-B378-AD7DD240E6C4}"/>
               </a:ext>
             </a:extLst>
           </p:cNvPr>
@@ -6083,7 +6089,7 @@
           <p:cNvPr id="2" name="Заголовок 1">
             <a:extLst>
               <a:ext uri="{FF2B5EF4-FFF2-40B4-BE49-F238E27FC236}">
-                <a16:creationId xmlns:a16="http://schemas.microsoft.com/office/drawing/2014/main" xmlns="" id="{E7310F3E-DD22-4E64-8428-41A460D11988}"/>
+                <a16:creationId xmlns="" xmlns:a16="http://schemas.microsoft.com/office/drawing/2014/main" id="{E7310F3E-DD22-4E64-8428-41A460D11988}"/>
               </a:ext>
             </a:extLst>
           </p:cNvPr>
@@ -6121,7 +6127,7 @@
           <p:cNvPr id="3" name="Объект 2">
             <a:extLst>
               <a:ext uri="{FF2B5EF4-FFF2-40B4-BE49-F238E27FC236}">
-                <a16:creationId xmlns:a16="http://schemas.microsoft.com/office/drawing/2014/main" xmlns="" id="{210D4AFA-D9BF-4026-B378-AD7DD240E6C4}"/>
+                <a16:creationId xmlns="" xmlns:a16="http://schemas.microsoft.com/office/drawing/2014/main" id="{210D4AFA-D9BF-4026-B378-AD7DD240E6C4}"/>
               </a:ext>
             </a:extLst>
           </p:cNvPr>
@@ -6209,7 +6215,7 @@
           <p:cNvPr id="2" name="Заголовок 1">
             <a:extLst>
               <a:ext uri="{FF2B5EF4-FFF2-40B4-BE49-F238E27FC236}">
-                <a16:creationId xmlns:a16="http://schemas.microsoft.com/office/drawing/2014/main" xmlns="" id="{E7310F3E-DD22-4E64-8428-41A460D11988}"/>
+                <a16:creationId xmlns="" xmlns:a16="http://schemas.microsoft.com/office/drawing/2014/main" id="{E7310F3E-DD22-4E64-8428-41A460D11988}"/>
               </a:ext>
             </a:extLst>
           </p:cNvPr>
@@ -6242,14 +6248,14 @@
           </a:p>
         </p:txBody>
       </p:sp>
-      <mc:AlternateContent xmlns:mc="http://schemas.openxmlformats.org/markup-compatibility/2006">
-        <mc:Choice xmlns:a14="http://schemas.microsoft.com/office/drawing/2010/main" Requires="a14">
+      <mc:AlternateContent xmlns:mc="http://schemas.openxmlformats.org/markup-compatibility/2006" xmlns:a14="http://schemas.microsoft.com/office/drawing/2010/main">
+        <mc:Choice Requires="a14">
           <p:sp>
             <p:nvSpPr>
               <p:cNvPr id="3" name="Объект 2">
                 <a:extLst>
                   <a:ext uri="{FF2B5EF4-FFF2-40B4-BE49-F238E27FC236}">
-                    <a16:creationId xmlns:a16="http://schemas.microsoft.com/office/drawing/2014/main" xmlns="" id="{210D4AFA-D9BF-4026-B378-AD7DD240E6C4}"/>
+                    <a16:creationId xmlns="" xmlns:a16="http://schemas.microsoft.com/office/drawing/2014/main" id="{210D4AFA-D9BF-4026-B378-AD7DD240E6C4}"/>
                   </a:ext>
                 </a:extLst>
               </p:cNvPr>
@@ -6617,7 +6623,7 @@
             </p:txBody>
           </p:sp>
         </mc:Choice>
-        <mc:Fallback>
+        <mc:Fallback xmlns="">
           <p:sp>
             <p:nvSpPr>
               <p:cNvPr id="3" name="Объект 2">
@@ -6666,7 +6672,7 @@
           <p:cNvPr id="7" name="Рисунок 6">
             <a:extLst>
               <a:ext uri="{FF2B5EF4-FFF2-40B4-BE49-F238E27FC236}">
-                <a16:creationId xmlns:a16="http://schemas.microsoft.com/office/drawing/2014/main" xmlns="" id="{72D99436-D4F2-4145-B199-BD86FFAF802A}"/>
+                <a16:creationId xmlns="" xmlns:a16="http://schemas.microsoft.com/office/drawing/2014/main" id="{72D99436-D4F2-4145-B199-BD86FFAF802A}"/>
               </a:ext>
             </a:extLst>
           </p:cNvPr>
@@ -6726,7 +6732,7 @@
           <p:cNvPr id="2" name="Заголовок 1">
             <a:extLst>
               <a:ext uri="{FF2B5EF4-FFF2-40B4-BE49-F238E27FC236}">
-                <a16:creationId xmlns:a16="http://schemas.microsoft.com/office/drawing/2014/main" xmlns="" id="{E7310F3E-DD22-4E64-8428-41A460D11988}"/>
+                <a16:creationId xmlns="" xmlns:a16="http://schemas.microsoft.com/office/drawing/2014/main" id="{E7310F3E-DD22-4E64-8428-41A460D11988}"/>
               </a:ext>
             </a:extLst>
           </p:cNvPr>
@@ -6766,7 +6772,7 @@
               <p:cNvPr id="3" name="Объект 2">
                 <a:extLst>
                   <a:ext uri="{FF2B5EF4-FFF2-40B4-BE49-F238E27FC236}">
-                    <a16:creationId xmlns:a16="http://schemas.microsoft.com/office/drawing/2014/main" xmlns="" id="{210D4AFA-D9BF-4026-B378-AD7DD240E6C4}"/>
+                    <a16:creationId xmlns="" xmlns:a16="http://schemas.microsoft.com/office/drawing/2014/main" id="{210D4AFA-D9BF-4026-B378-AD7DD240E6C4}"/>
                   </a:ext>
                 </a:extLst>
               </p:cNvPr>
@@ -7159,7 +7165,7 @@
           <p:cNvPr id="5" name="Рисунок 4">
             <a:extLst>
               <a:ext uri="{FF2B5EF4-FFF2-40B4-BE49-F238E27FC236}">
-                <a16:creationId xmlns:a16="http://schemas.microsoft.com/office/drawing/2014/main" xmlns="" id="{FB870E09-61DB-426A-8F2A-D65638D14259}"/>
+                <a16:creationId xmlns="" xmlns:a16="http://schemas.microsoft.com/office/drawing/2014/main" id="{FB870E09-61DB-426A-8F2A-D65638D14259}"/>
               </a:ext>
             </a:extLst>
           </p:cNvPr>
@@ -7169,7 +7175,7 @@
           <p:nvPr/>
         </p:nvPicPr>
         <p:blipFill>
-          <a:blip r:embed="rId2"/>
+          <a:blip r:embed="rId3"/>
           <a:stretch>
             <a:fillRect/>
           </a:stretch>

</xml_diff>